<commit_message>
More Edits README and PPT
</commit_message>
<xml_diff>
--- a/Project_Two_XRP_Analysis.pptx
+++ b/Project_Two_XRP_Analysis.pptx
@@ -13,10 +13,10 @@
     <p:sldId id="328" r:id="rId4"/>
     <p:sldId id="315" r:id="rId5"/>
     <p:sldId id="329" r:id="rId6"/>
-    <p:sldId id="331" r:id="rId7"/>
-    <p:sldId id="332" r:id="rId8"/>
-    <p:sldId id="333" r:id="rId9"/>
-    <p:sldId id="334" r:id="rId10"/>
+    <p:sldId id="332" r:id="rId7"/>
+    <p:sldId id="333" r:id="rId8"/>
+    <p:sldId id="334" r:id="rId9"/>
+    <p:sldId id="331" r:id="rId10"/>
   </p:sldIdLst>
   <p:sldSz cx="9144000" cy="5143500" type="screen16x9"/>
   <p:notesSz cx="6858000" cy="9144000"/>
@@ -216,7 +216,7 @@
           <a:p>
             <a:fld id="{8E622622-0D21-485C-AA80-DDAF7F1863E6}" type="datetimeFigureOut">
               <a:rPr lang="en-US" smtClean="0"/>
-              <a:t>4/5/22</a:t>
+              <a:t>4/7/22</a:t>
             </a:fld>
             <a:endParaRPr lang="en-US"/>
           </a:p>
@@ -743,7 +743,7 @@
           <a:p>
             <a:fld id="{98FEAEE1-41C1-4806-A95A-94B133B5FAE5}" type="datetimeFigureOut">
               <a:rPr lang="en-US" smtClean="0"/>
-              <a:t>4/5/22</a:t>
+              <a:t>4/7/22</a:t>
             </a:fld>
             <a:endParaRPr lang="en-US"/>
           </a:p>
@@ -952,7 +952,7 @@
           <a:p>
             <a:fld id="{98FEAEE1-41C1-4806-A95A-94B133B5FAE5}" type="datetimeFigureOut">
               <a:rPr lang="en-US" smtClean="0"/>
-              <a:t>4/5/22</a:t>
+              <a:t>4/7/22</a:t>
             </a:fld>
             <a:endParaRPr lang="en-US"/>
           </a:p>
@@ -1125,7 +1125,7 @@
           <a:p>
             <a:fld id="{98FEAEE1-41C1-4806-A95A-94B133B5FAE5}" type="datetimeFigureOut">
               <a:rPr lang="en-US" smtClean="0"/>
-              <a:t>4/5/22</a:t>
+              <a:t>4/7/22</a:t>
             </a:fld>
             <a:endParaRPr lang="en-US"/>
           </a:p>
@@ -1350,7 +1350,7 @@
           <a:p>
             <a:fld id="{98FEAEE1-41C1-4806-A95A-94B133B5FAE5}" type="datetimeFigureOut">
               <a:rPr lang="en-US" smtClean="0"/>
-              <a:t>4/5/22</a:t>
+              <a:t>4/7/22</a:t>
             </a:fld>
             <a:endParaRPr lang="en-US"/>
           </a:p>
@@ -1847,7 +1847,7 @@
           <a:p>
             <a:fld id="{98FEAEE1-41C1-4806-A95A-94B133B5FAE5}" type="datetimeFigureOut">
               <a:rPr lang="en-US" smtClean="0"/>
-              <a:t>4/5/22</a:t>
+              <a:t>4/7/22</a:t>
             </a:fld>
             <a:endParaRPr lang="en-US"/>
           </a:p>
@@ -2266,7 +2266,7 @@
           <a:p>
             <a:fld id="{98FEAEE1-41C1-4806-A95A-94B133B5FAE5}" type="datetimeFigureOut">
               <a:rPr lang="en-US" smtClean="0"/>
-              <a:t>4/5/22</a:t>
+              <a:t>4/7/22</a:t>
             </a:fld>
             <a:endParaRPr lang="en-US"/>
           </a:p>
@@ -2378,7 +2378,7 @@
           <a:p>
             <a:fld id="{98FEAEE1-41C1-4806-A95A-94B133B5FAE5}" type="datetimeFigureOut">
               <a:rPr lang="en-US" smtClean="0"/>
-              <a:t>4/5/22</a:t>
+              <a:t>4/7/22</a:t>
             </a:fld>
             <a:endParaRPr lang="en-US"/>
           </a:p>
@@ -2468,7 +2468,7 @@
           <a:p>
             <a:fld id="{98FEAEE1-41C1-4806-A95A-94B133B5FAE5}" type="datetimeFigureOut">
               <a:rPr lang="en-US" smtClean="0"/>
-              <a:t>4/5/22</a:t>
+              <a:t>4/7/22</a:t>
             </a:fld>
             <a:endParaRPr lang="en-US"/>
           </a:p>
@@ -2738,7 +2738,7 @@
           <a:p>
             <a:fld id="{98FEAEE1-41C1-4806-A95A-94B133B5FAE5}" type="datetimeFigureOut">
               <a:rPr lang="en-US" smtClean="0"/>
-              <a:t>4/5/22</a:t>
+              <a:t>4/7/22</a:t>
             </a:fld>
             <a:endParaRPr lang="en-US"/>
           </a:p>
@@ -2985,7 +2985,7 @@
           <a:p>
             <a:fld id="{98FEAEE1-41C1-4806-A95A-94B133B5FAE5}" type="datetimeFigureOut">
               <a:rPr lang="en-US" smtClean="0"/>
-              <a:t>4/5/22</a:t>
+              <a:t>4/7/22</a:t>
             </a:fld>
             <a:endParaRPr lang="en-US"/>
           </a:p>
@@ -3191,7 +3191,7 @@
           <a:p>
             <a:fld id="{98FEAEE1-41C1-4806-A95A-94B133B5FAE5}" type="datetimeFigureOut">
               <a:rPr lang="en-US" smtClean="0"/>
-              <a:t>4/5/22</a:t>
+              <a:t>4/7/22</a:t>
             </a:fld>
             <a:endParaRPr lang="en-US"/>
           </a:p>
@@ -3977,7 +3977,7 @@
         <p:spPr>
           <a:xfrm>
             <a:off x="457200" y="1032867"/>
-            <a:ext cx="3451253" cy="3077766"/>
+            <a:ext cx="3451253" cy="3323987"/>
           </a:xfrm>
           <a:prstGeom prst="rect">
             <a:avLst/>
@@ -4010,7 +4010,7 @@
             </a:pPr>
             <a:r>
               <a:rPr lang="en-US" sz="1600" dirty="0"/>
-              <a:t>Use Machine Learning Models to predict future prices of a Crypto Currency – Ripple (XRP)</a:t>
+              <a:t>Use Machine Learning Models to predict future prices, volatility and sentiment  of a Crypto Currency – Ripple (XRP)</a:t>
             </a:r>
           </a:p>
           <a:p>
@@ -4906,39 +4906,58 @@
       </p:grpSpPr>
       <p:sp>
         <p:nvSpPr>
-          <p:cNvPr id="2" name="TextBox 1">
+          <p:cNvPr id="2" name="Title 1">
             <a:extLst>
               <a:ext uri="{FF2B5EF4-FFF2-40B4-BE49-F238E27FC236}">
-                <a16:creationId xmlns:a16="http://schemas.microsoft.com/office/drawing/2014/main" id="{C0D43654-3BE1-B549-B4FB-D119A3CA6DBB}"/>
+                <a16:creationId xmlns:a16="http://schemas.microsoft.com/office/drawing/2014/main" id="{5D6E5C07-E5E6-8449-824B-B112C860958B}"/>
               </a:ext>
             </a:extLst>
           </p:cNvPr>
-          <p:cNvSpPr txBox="1"/>
-          <p:nvPr/>
-        </p:nvSpPr>
-        <p:spPr>
-          <a:xfrm>
-            <a:off x="150311" y="150312"/>
-            <a:ext cx="8818323" cy="461665"/>
-          </a:xfrm>
-          <a:prstGeom prst="rect">
-            <a:avLst/>
-          </a:prstGeom>
-          <a:noFill/>
-        </p:spPr>
-        <p:txBody>
-          <a:bodyPr wrap="square" rtlCol="0">
-            <a:spAutoFit/>
+          <p:cNvSpPr>
+            <a:spLocks noGrp="1"/>
+          </p:cNvSpPr>
+          <p:nvPr>
+            <p:ph type="title"/>
+          </p:nvPr>
+        </p:nvSpPr>
+        <p:spPr/>
+        <p:txBody>
+          <a:bodyPr/>
+          <a:lstStyle/>
+          <a:p>
+            <a:r>
+              <a:rPr lang="en-US" dirty="0"/>
+              <a:t>Bollinger Bands</a:t>
+            </a:r>
+          </a:p>
+        </p:txBody>
+      </p:sp>
+      <p:sp>
+        <p:nvSpPr>
+          <p:cNvPr id="3" name="Content Placeholder 2">
+            <a:extLst>
+              <a:ext uri="{FF2B5EF4-FFF2-40B4-BE49-F238E27FC236}">
+                <a16:creationId xmlns:a16="http://schemas.microsoft.com/office/drawing/2014/main" id="{323F27F9-8CFF-D64F-8A5D-9C9E1BC5DEEA}"/>
+              </a:ext>
+            </a:extLst>
+          </p:cNvPr>
+          <p:cNvSpPr>
+            <a:spLocks noGrp="1"/>
+          </p:cNvSpPr>
+          <p:nvPr>
+            <p:ph idx="1"/>
+          </p:nvPr>
+        </p:nvSpPr>
+        <p:spPr/>
+        <p:txBody>
+          <a:bodyPr>
+            <a:normAutofit/>
           </a:bodyPr>
           <a:lstStyle/>
           <a:p>
             <a:r>
-              <a:rPr lang="en-US" sz="2400" dirty="0">
-                <a:solidFill>
-                  <a:schemeClr val="bg1"/>
-                </a:solidFill>
-              </a:rPr>
-              <a:t>Correlation between Population / Average Income and Store Counts </a:t>
+              <a:rPr lang="en-US" dirty="0"/>
+              <a:t>Bollinger Bands are a TA indicator are plotted at a standard deviation level above and below a simple moving average of the price</a:t>
             </a:r>
           </a:p>
         </p:txBody>
@@ -4946,7 +4965,7 @@
     </p:spTree>
     <p:extLst>
       <p:ext uri="{BB962C8B-B14F-4D97-AF65-F5344CB8AC3E}">
-        <p14:creationId xmlns:p14="http://schemas.microsoft.com/office/powerpoint/2010/main" val="2644224465"/>
+        <p14:creationId xmlns:p14="http://schemas.microsoft.com/office/powerpoint/2010/main" val="1197724708"/>
       </p:ext>
     </p:extLst>
   </p:cSld>
@@ -4978,7 +4997,7 @@
           <p:cNvPr id="2" name="Title 1">
             <a:extLst>
               <a:ext uri="{FF2B5EF4-FFF2-40B4-BE49-F238E27FC236}">
-                <a16:creationId xmlns:a16="http://schemas.microsoft.com/office/drawing/2014/main" id="{5D6E5C07-E5E6-8449-824B-B112C860958B}"/>
+                <a16:creationId xmlns:a16="http://schemas.microsoft.com/office/drawing/2014/main" id="{48431534-64B0-CD4A-A8CB-A0D121CEC674}"/>
               </a:ext>
             </a:extLst>
           </p:cNvPr>
@@ -4989,52 +5008,61 @@
             <p:ph type="title"/>
           </p:nvPr>
         </p:nvSpPr>
-        <p:spPr/>
-        <p:txBody>
-          <a:bodyPr/>
+        <p:spPr>
+          <a:xfrm>
+            <a:off x="457200" y="205979"/>
+            <a:ext cx="8229600" cy="613171"/>
+          </a:xfrm>
+        </p:spPr>
+        <p:txBody>
+          <a:bodyPr anchor="t">
+            <a:normAutofit/>
+          </a:bodyPr>
           <a:lstStyle/>
           <a:p>
             <a:r>
               <a:rPr lang="en-US" dirty="0"/>
-              <a:t>Bollinger Bands</a:t>
-            </a:r>
-          </a:p>
-        </p:txBody>
-      </p:sp>
-      <p:sp>
-        <p:nvSpPr>
-          <p:cNvPr id="3" name="Content Placeholder 2">
+              <a:t>XRP Bollinger Bands</a:t>
+            </a:r>
+          </a:p>
+        </p:txBody>
+      </p:sp>
+      <p:pic>
+        <p:nvPicPr>
+          <p:cNvPr id="4" name="Content Placeholder 3">
             <a:extLst>
               <a:ext uri="{FF2B5EF4-FFF2-40B4-BE49-F238E27FC236}">
-                <a16:creationId xmlns:a16="http://schemas.microsoft.com/office/drawing/2014/main" id="{323F27F9-8CFF-D64F-8A5D-9C9E1BC5DEEA}"/>
+                <a16:creationId xmlns:a16="http://schemas.microsoft.com/office/drawing/2014/main" id="{92692FAF-7F2B-994F-A39B-89E54C3BFFE7}"/>
               </a:ext>
             </a:extLst>
           </p:cNvPr>
-          <p:cNvSpPr>
-            <a:spLocks noGrp="1"/>
-          </p:cNvSpPr>
+          <p:cNvPicPr>
+            <a:picLocks noGrp="1" noChangeAspect="1"/>
+          </p:cNvPicPr>
           <p:nvPr>
             <p:ph idx="1"/>
           </p:nvPr>
-        </p:nvSpPr>
-        <p:spPr/>
-        <p:txBody>
-          <a:bodyPr>
-            <a:normAutofit/>
-          </a:bodyPr>
-          <a:lstStyle/>
-          <a:p>
-            <a:r>
-              <a:rPr lang="en-US" dirty="0"/>
-              <a:t>Bollinger Bands are a TA indicator are plotted at a standard deviation level above and below a simple moving average of the price</a:t>
-            </a:r>
-          </a:p>
-        </p:txBody>
-      </p:sp>
+        </p:nvPicPr>
+        <p:blipFill rotWithShape="1">
+          <a:blip r:embed="rId2"/>
+          <a:srcRect l="13697" t="27099" r="38951" b="23234"/>
+          <a:stretch/>
+        </p:blipFill>
+        <p:spPr>
+          <a:xfrm>
+            <a:off x="457200" y="819149"/>
+            <a:ext cx="5386388" cy="3531077"/>
+          </a:xfrm>
+          <a:prstGeom prst="rect">
+            <a:avLst/>
+          </a:prstGeom>
+          <a:noFill/>
+        </p:spPr>
+      </p:pic>
     </p:spTree>
     <p:extLst>
       <p:ext uri="{BB962C8B-B14F-4D97-AF65-F5344CB8AC3E}">
-        <p14:creationId xmlns:p14="http://schemas.microsoft.com/office/powerpoint/2010/main" val="1197724708"/>
+        <p14:creationId xmlns:p14="http://schemas.microsoft.com/office/powerpoint/2010/main" val="1027029244"/>
       </p:ext>
     </p:extLst>
   </p:cSld>
@@ -5066,7 +5094,7 @@
           <p:cNvPr id="2" name="Title 1">
             <a:extLst>
               <a:ext uri="{FF2B5EF4-FFF2-40B4-BE49-F238E27FC236}">
-                <a16:creationId xmlns:a16="http://schemas.microsoft.com/office/drawing/2014/main" id="{48431534-64B0-CD4A-A8CB-A0D121CEC674}"/>
+                <a16:creationId xmlns:a16="http://schemas.microsoft.com/office/drawing/2014/main" id="{FE426BEA-6665-144B-AC6E-9605C21BC970}"/>
               </a:ext>
             </a:extLst>
           </p:cNvPr>
@@ -5077,21 +5105,14 @@
             <p:ph type="title"/>
           </p:nvPr>
         </p:nvSpPr>
-        <p:spPr>
-          <a:xfrm>
-            <a:off x="457200" y="205979"/>
-            <a:ext cx="8229600" cy="613171"/>
-          </a:xfrm>
-        </p:spPr>
-        <p:txBody>
-          <a:bodyPr anchor="t">
-            <a:normAutofit/>
-          </a:bodyPr>
+        <p:spPr/>
+        <p:txBody>
+          <a:bodyPr/>
           <a:lstStyle/>
           <a:p>
             <a:r>
               <a:rPr lang="en-US" dirty="0"/>
-              <a:t>XRP Bollinger Bands</a:t>
+              <a:t>XRP Sentiment Analysis</a:t>
             </a:r>
           </a:p>
         </p:txBody>
@@ -5101,7 +5122,7 @@
           <p:cNvPr id="4" name="Content Placeholder 3">
             <a:extLst>
               <a:ext uri="{FF2B5EF4-FFF2-40B4-BE49-F238E27FC236}">
-                <a16:creationId xmlns:a16="http://schemas.microsoft.com/office/drawing/2014/main" id="{92692FAF-7F2B-994F-A39B-89E54C3BFFE7}"/>
+                <a16:creationId xmlns:a16="http://schemas.microsoft.com/office/drawing/2014/main" id="{7BFBA3E7-ABE6-5F42-B08D-7821CE36A3C7}"/>
               </a:ext>
             </a:extLst>
           </p:cNvPr>
@@ -5114,24 +5135,52 @@
         </p:nvPicPr>
         <p:blipFill rotWithShape="1">
           <a:blip r:embed="rId2"/>
-          <a:srcRect l="13697" t="27099" r="38951" b="23234"/>
+          <a:srcRect l="21060" t="62020" r="57893" b="14827"/>
           <a:stretch/>
         </p:blipFill>
         <p:spPr>
           <a:xfrm>
-            <a:off x="457200" y="819149"/>
-            <a:ext cx="5386388" cy="3531077"/>
+            <a:off x="229895" y="1184074"/>
+            <a:ext cx="3917382" cy="2693196"/>
           </a:xfrm>
           <a:prstGeom prst="rect">
             <a:avLst/>
           </a:prstGeom>
-          <a:noFill/>
+        </p:spPr>
+      </p:pic>
+      <p:pic>
+        <p:nvPicPr>
+          <p:cNvPr id="5" name="Picture 4">
+            <a:extLst>
+              <a:ext uri="{FF2B5EF4-FFF2-40B4-BE49-F238E27FC236}">
+                <a16:creationId xmlns:a16="http://schemas.microsoft.com/office/drawing/2014/main" id="{816AA324-A0AC-4740-BA00-2202EED65030}"/>
+              </a:ext>
+            </a:extLst>
+          </p:cNvPr>
+          <p:cNvPicPr>
+            <a:picLocks noChangeAspect="1"/>
+          </p:cNvPicPr>
+          <p:nvPr/>
+        </p:nvPicPr>
+        <p:blipFill rotWithShape="1">
+          <a:blip r:embed="rId3"/>
+          <a:srcRect l="20833" t="61944" r="55729" b="14722"/>
+          <a:stretch/>
+        </p:blipFill>
+        <p:spPr>
+          <a:xfrm>
+            <a:off x="4204012" y="1184074"/>
+            <a:ext cx="4710093" cy="2930726"/>
+          </a:xfrm>
+          <a:prstGeom prst="rect">
+            <a:avLst/>
+          </a:prstGeom>
         </p:spPr>
       </p:pic>
     </p:spTree>
     <p:extLst>
       <p:ext uri="{BB962C8B-B14F-4D97-AF65-F5344CB8AC3E}">
-        <p14:creationId xmlns:p14="http://schemas.microsoft.com/office/powerpoint/2010/main" val="1027029244"/>
+        <p14:creationId xmlns:p14="http://schemas.microsoft.com/office/powerpoint/2010/main" val="668356923"/>
       </p:ext>
     </p:extLst>
   </p:cSld>
@@ -5160,96 +5209,215 @@
       </p:grpSpPr>
       <p:sp>
         <p:nvSpPr>
-          <p:cNvPr id="2" name="Title 1">
+          <p:cNvPr id="2" name="TextBox 1">
             <a:extLst>
               <a:ext uri="{FF2B5EF4-FFF2-40B4-BE49-F238E27FC236}">
-                <a16:creationId xmlns:a16="http://schemas.microsoft.com/office/drawing/2014/main" id="{FE426BEA-6665-144B-AC6E-9605C21BC970}"/>
+                <a16:creationId xmlns:a16="http://schemas.microsoft.com/office/drawing/2014/main" id="{C0D43654-3BE1-B549-B4FB-D119A3CA6DBB}"/>
               </a:ext>
             </a:extLst>
           </p:cNvPr>
-          <p:cNvSpPr>
-            <a:spLocks noGrp="1"/>
-          </p:cNvSpPr>
-          <p:nvPr>
-            <p:ph type="title"/>
-          </p:nvPr>
-        </p:nvSpPr>
-        <p:spPr/>
-        <p:txBody>
-          <a:bodyPr/>
-          <a:lstStyle/>
-          <a:p>
-            <a:r>
-              <a:rPr lang="en-US" dirty="0"/>
-              <a:t>XRP Sentiment Analysis</a:t>
-            </a:r>
-          </a:p>
-        </p:txBody>
-      </p:sp>
-      <p:pic>
-        <p:nvPicPr>
-          <p:cNvPr id="4" name="Content Placeholder 3">
+          <p:cNvSpPr txBox="1"/>
+          <p:nvPr/>
+        </p:nvSpPr>
+        <p:spPr>
+          <a:xfrm>
+            <a:off x="150311" y="150312"/>
+            <a:ext cx="8818323" cy="738664"/>
+          </a:xfrm>
+          <a:prstGeom prst="rect">
+            <a:avLst/>
+          </a:prstGeom>
+          <a:noFill/>
+        </p:spPr>
+        <p:txBody>
+          <a:bodyPr wrap="square" rtlCol="0">
+            <a:spAutoFit/>
+          </a:bodyPr>
+          <a:lstStyle/>
+          <a:p>
+            <a:pPr algn="ctr"/>
+            <a:r>
+              <a:rPr lang="en-US" sz="2800" b="1" dirty="0">
+                <a:solidFill>
+                  <a:srgbClr val="C9D1D9"/>
+                </a:solidFill>
+                <a:latin typeface="-apple-system"/>
+              </a:rPr>
+              <a:t>Summary - Investment Recommendations</a:t>
+            </a:r>
+          </a:p>
+          <a:p>
+            <a:pPr algn="ctr"/>
+            <a:r>
+              <a:rPr lang="en-US" sz="1400" b="1" dirty="0">
+                <a:solidFill>
+                  <a:srgbClr val="C9D1D9"/>
+                </a:solidFill>
+                <a:latin typeface="-apple-system"/>
+              </a:rPr>
+              <a:t>(for academic use only, NOT for specific investment advice)</a:t>
+            </a:r>
+          </a:p>
+        </p:txBody>
+      </p:sp>
+      <p:sp>
+        <p:nvSpPr>
+          <p:cNvPr id="3" name="Rectangle 2">
             <a:extLst>
               <a:ext uri="{FF2B5EF4-FFF2-40B4-BE49-F238E27FC236}">
-                <a16:creationId xmlns:a16="http://schemas.microsoft.com/office/drawing/2014/main" id="{7BFBA3E7-ABE6-5F42-B08D-7821CE36A3C7}"/>
+                <a16:creationId xmlns:a16="http://schemas.microsoft.com/office/drawing/2014/main" id="{8B469D8B-598C-9E41-B703-3D67731B683E}"/>
               </a:ext>
             </a:extLst>
           </p:cNvPr>
-          <p:cNvPicPr>
-            <a:picLocks noGrp="1" noChangeAspect="1"/>
-          </p:cNvPicPr>
-          <p:nvPr>
-            <p:ph idx="1"/>
-          </p:nvPr>
-        </p:nvPicPr>
-        <p:blipFill rotWithShape="1">
-          <a:blip r:embed="rId2"/>
-          <a:srcRect l="21060" t="62020" r="57893" b="14827"/>
-          <a:stretch/>
-        </p:blipFill>
+          <p:cNvSpPr/>
+          <p:nvPr/>
+        </p:nvSpPr>
         <p:spPr>
           <a:xfrm>
-            <a:off x="229895" y="1184074"/>
-            <a:ext cx="3917382" cy="2693196"/>
+            <a:off x="306254" y="888976"/>
+            <a:ext cx="8506436" cy="3816429"/>
           </a:xfrm>
           <a:prstGeom prst="rect">
             <a:avLst/>
           </a:prstGeom>
         </p:spPr>
-      </p:pic>
-      <p:pic>
-        <p:nvPicPr>
-          <p:cNvPr id="5" name="Picture 4">
-            <a:extLst>
-              <a:ext uri="{FF2B5EF4-FFF2-40B4-BE49-F238E27FC236}">
-                <a16:creationId xmlns:a16="http://schemas.microsoft.com/office/drawing/2014/main" id="{816AA324-A0AC-4740-BA00-2202EED65030}"/>
-              </a:ext>
-            </a:extLst>
-          </p:cNvPr>
-          <p:cNvPicPr>
-            <a:picLocks noChangeAspect="1"/>
-          </p:cNvPicPr>
-          <p:nvPr/>
-        </p:nvPicPr>
-        <p:blipFill rotWithShape="1">
-          <a:blip r:embed="rId3"/>
-          <a:srcRect l="20833" t="61944" r="55729" b="14722"/>
-          <a:stretch/>
-        </p:blipFill>
-        <p:spPr>
-          <a:xfrm>
-            <a:off x="4204012" y="1184074"/>
-            <a:ext cx="4710093" cy="2930726"/>
-          </a:xfrm>
-          <a:prstGeom prst="rect">
-            <a:avLst/>
-          </a:prstGeom>
-        </p:spPr>
-      </p:pic>
+        <p:txBody>
+          <a:bodyPr wrap="square">
+            <a:spAutoFit/>
+          </a:bodyPr>
+          <a:lstStyle/>
+          <a:p>
+            <a:r>
+              <a:rPr lang="en-US" b="1" dirty="0">
+                <a:solidFill>
+                  <a:srgbClr val="C9D1D9"/>
+                </a:solidFill>
+                <a:latin typeface="-apple-system"/>
+              </a:rPr>
+              <a:t>Price Prediction</a:t>
+            </a:r>
+          </a:p>
+          <a:p>
+            <a:pPr marL="342900" indent="-342900">
+              <a:buAutoNum type="arabicPeriod"/>
+            </a:pPr>
+            <a:r>
+              <a:rPr lang="en-US" sz="1400" dirty="0">
+                <a:solidFill>
+                  <a:srgbClr val="C9D1D9"/>
+                </a:solidFill>
+                <a:latin typeface="-apple-system"/>
+              </a:rPr>
+              <a:t>All three models showed upward price predictions over the upcoming week </a:t>
+            </a:r>
+          </a:p>
+          <a:p>
+            <a:pPr marL="342900" indent="-342900">
+              <a:buAutoNum type="arabicPeriod"/>
+            </a:pPr>
+            <a:r>
+              <a:rPr lang="en-US" sz="1400" dirty="0">
+                <a:solidFill>
+                  <a:srgbClr val="C9D1D9"/>
+                </a:solidFill>
+                <a:latin typeface="-apple-system"/>
+              </a:rPr>
+              <a:t>The GARCH volatility model showed higher risk, but this is not uncommon in the crypto space </a:t>
+            </a:r>
+          </a:p>
+          <a:p>
+            <a:pPr marL="342900" indent="-342900">
+              <a:buAutoNum type="arabicPeriod"/>
+            </a:pPr>
+            <a:r>
+              <a:rPr lang="en-US" sz="1400" dirty="0">
+                <a:solidFill>
+                  <a:srgbClr val="C9D1D9"/>
+                </a:solidFill>
+                <a:latin typeface="-apple-system"/>
+              </a:rPr>
+              <a:t>The Sentiment Analysis showed relatively neutral, which is a positive signal, as crypto stocks have been in a down-turn since November of 2021 </a:t>
+            </a:r>
+          </a:p>
+          <a:p>
+            <a:r>
+              <a:rPr lang="en-US" b="1" dirty="0">
+                <a:solidFill>
+                  <a:srgbClr val="C9D1D9"/>
+                </a:solidFill>
+                <a:latin typeface="-apple-system"/>
+              </a:rPr>
+              <a:t>Technical Analysis</a:t>
+            </a:r>
+          </a:p>
+          <a:p>
+            <a:pPr marL="342900" indent="-342900">
+              <a:buAutoNum type="arabicPeriod"/>
+            </a:pPr>
+            <a:r>
+              <a:rPr lang="en-US" sz="1400" dirty="0">
+                <a:solidFill>
+                  <a:srgbClr val="C9D1D9"/>
+                </a:solidFill>
+                <a:latin typeface="-apple-system"/>
+              </a:rPr>
+              <a:t>Analysis of the Moving Average indicators, we see an upward trend in XRP with the lower MA crossing up and over the higher MA around March 17th </a:t>
+            </a:r>
+          </a:p>
+          <a:p>
+            <a:pPr marL="342900" indent="-342900">
+              <a:buAutoNum type="arabicPeriod"/>
+            </a:pPr>
+            <a:r>
+              <a:rPr lang="en-US" sz="1400" dirty="0">
+                <a:solidFill>
+                  <a:srgbClr val="C9D1D9"/>
+                </a:solidFill>
+                <a:latin typeface="-apple-system"/>
+              </a:rPr>
+              <a:t>We also see the price action moving up past the Fibonacci 0.382 band and towards the 0.5 band, showing a bullish signal </a:t>
+            </a:r>
+          </a:p>
+          <a:p>
+            <a:pPr marL="342900" indent="-342900">
+              <a:buAutoNum type="arabicPeriod"/>
+            </a:pPr>
+            <a:r>
+              <a:rPr lang="en-US" sz="1400" dirty="0">
+                <a:solidFill>
+                  <a:srgbClr val="C9D1D9"/>
+                </a:solidFill>
+                <a:latin typeface="-apple-system"/>
+              </a:rPr>
+              <a:t>Lastly, the Bollinger Band analysis shows an upward trend but not breaking out above the high band. The band is trending slightly upward, but looks to be consolidating, which could be an indicator of a break-up in price. </a:t>
+            </a:r>
+          </a:p>
+          <a:p>
+            <a:endParaRPr lang="en-US" b="1" dirty="0">
+              <a:solidFill>
+                <a:srgbClr val="C9D1D9"/>
+              </a:solidFill>
+              <a:latin typeface="-apple-system"/>
+            </a:endParaRPr>
+          </a:p>
+          <a:p>
+            <a:pPr algn="ctr"/>
+            <a:r>
+              <a:rPr lang="en-US" sz="2400" b="1" dirty="0">
+                <a:solidFill>
+                  <a:srgbClr val="C9D1D9"/>
+                </a:solidFill>
+                <a:latin typeface="-apple-system"/>
+              </a:rPr>
+              <a:t>Our XRP investment recommendation, based on price prediction models and technical analysis, is a buy at this time</a:t>
+            </a:r>
+          </a:p>
+        </p:txBody>
+      </p:sp>
     </p:spTree>
     <p:extLst>
       <p:ext uri="{BB962C8B-B14F-4D97-AF65-F5344CB8AC3E}">
-        <p14:creationId xmlns:p14="http://schemas.microsoft.com/office/powerpoint/2010/main" val="668356923"/>
+        <p14:creationId xmlns:p14="http://schemas.microsoft.com/office/powerpoint/2010/main" val="2644224465"/>
       </p:ext>
     </p:extLst>
   </p:cSld>

</xml_diff>